<commit_message>
update to ppt template
</commit_message>
<xml_diff>
--- a/deliverables/league_ppt_template.pptx
+++ b/deliverables/league_ppt_template.pptx
@@ -8,8 +8,9 @@
     <p:sldId id="258" r:id="rId2"/>
     <p:sldId id="260" r:id="rId3"/>
     <p:sldId id="256" r:id="rId4"/>
-    <p:sldId id="257" r:id="rId5"/>
-    <p:sldId id="259" r:id="rId6"/>
+    <p:sldId id="261" r:id="rId5"/>
+    <p:sldId id="257" r:id="rId6"/>
+    <p:sldId id="259" r:id="rId7"/>
   </p:sldIdLst>
   <p:sldSz cx="12192000" cy="6858000"/>
   <p:notesSz cx="6858000" cy="9144000"/>
@@ -3826,7 +3827,7 @@
         </p:nvSpPr>
         <p:spPr>
           <a:xfrm>
-            <a:off x="3471731" y="2523066"/>
+            <a:off x="3471731" y="2976033"/>
             <a:ext cx="5248538" cy="905934"/>
           </a:xfrm>
           <a:prstGeom prst="rect">
@@ -3860,12 +3861,12 @@
             <a:r>
               <a:rPr lang="en-US" sz="5400" b="1" dirty="0">
                 <a:solidFill>
-                  <a:srgbClr val="C89B38"/>
+                  <a:srgbClr val="55B5A1"/>
                 </a:solidFill>
                 <a:latin typeface="BeaufortforLOL-Regular" panose="02020503050000020004" pitchFamily="18" charset="0"/>
                 <a:cs typeface="BeaufortforLOL-Regular" panose="02020503050000020004" pitchFamily="18" charset="0"/>
               </a:rPr>
-              <a:t>INTRODUCTION</a:t>
+              <a:t>OVERVIEW</a:t>
             </a:r>
           </a:p>
         </p:txBody>
@@ -4447,7 +4448,7 @@
           <p:cNvPr id="4" name="Rectangle 3">
             <a:extLst>
               <a:ext uri="{FF2B5EF4-FFF2-40B4-BE49-F238E27FC236}">
-                <a16:creationId xmlns:a16="http://schemas.microsoft.com/office/drawing/2014/main" id="{8DF61846-AB51-45D4-AAE5-348A089B73AD}"/>
+                <a16:creationId xmlns:a16="http://schemas.microsoft.com/office/drawing/2014/main" id="{540D33D4-EE1E-496F-993B-3971D6FB7DF1}"/>
               </a:ext>
             </a:extLst>
           </p:cNvPr>
@@ -4457,17 +4458,17 @@
         <p:spPr>
           <a:xfrm>
             <a:off x="0" y="0"/>
-            <a:ext cx="12192000" cy="6743604"/>
+            <a:ext cx="12192000" cy="6858000"/>
           </a:xfrm>
           <a:prstGeom prst="rect">
             <a:avLst/>
           </a:prstGeom>
           <a:solidFill>
-            <a:srgbClr val="0E191D"/>
+            <a:srgbClr val="132225"/>
           </a:solidFill>
           <a:ln>
             <a:solidFill>
-              <a:srgbClr val="0E191D"/>
+              <a:srgbClr val="132225"/>
             </a:solidFill>
           </a:ln>
         </p:spPr>
@@ -4501,7 +4502,7 @@
           <p:cNvPr id="5" name="Rectangle 4">
             <a:extLst>
               <a:ext uri="{FF2B5EF4-FFF2-40B4-BE49-F238E27FC236}">
-                <a16:creationId xmlns:a16="http://schemas.microsoft.com/office/drawing/2014/main" id="{D890954F-FA6E-4DFA-9206-99220FA20E9F}"/>
+                <a16:creationId xmlns:a16="http://schemas.microsoft.com/office/drawing/2014/main" id="{73247242-D387-468E-9789-8515BE34F3E9}"/>
               </a:ext>
             </a:extLst>
           </p:cNvPr>
@@ -4511,17 +4512,17 @@
         <p:spPr>
           <a:xfrm>
             <a:off x="0" y="6714498"/>
-            <a:ext cx="12192000" cy="143502"/>
+            <a:ext cx="12192000" cy="143501"/>
           </a:xfrm>
           <a:prstGeom prst="rect">
             <a:avLst/>
           </a:prstGeom>
           <a:solidFill>
-            <a:srgbClr val="080D10"/>
+            <a:srgbClr val="091113"/>
           </a:solidFill>
           <a:ln>
             <a:solidFill>
-              <a:srgbClr val="080D10"/>
+              <a:srgbClr val="091113"/>
             </a:solidFill>
           </a:ln>
         </p:spPr>
@@ -4550,12 +4551,138 @@
           </a:p>
         </p:txBody>
       </p:sp>
-      <p:sp>
-        <p:nvSpPr>
-          <p:cNvPr id="6" name="Rectangle 5">
-            <a:extLst>
-              <a:ext uri="{FF2B5EF4-FFF2-40B4-BE49-F238E27FC236}">
-                <a16:creationId xmlns:a16="http://schemas.microsoft.com/office/drawing/2014/main" id="{3F98857D-DD99-4696-A9D9-5E7BAAEE940F}"/>
+      <p:pic>
+        <p:nvPicPr>
+          <p:cNvPr id="9" name="Picture 8">
+            <a:extLst>
+              <a:ext uri="{FF2B5EF4-FFF2-40B4-BE49-F238E27FC236}">
+                <a16:creationId xmlns:a16="http://schemas.microsoft.com/office/drawing/2014/main" id="{1EC4EF51-BBF0-4F6E-923A-7CBAB5248E47}"/>
+              </a:ext>
+            </a:extLst>
+          </p:cNvPr>
+          <p:cNvPicPr>
+            <a:picLocks noChangeAspect="1"/>
+          </p:cNvPicPr>
+          <p:nvPr/>
+        </p:nvPicPr>
+        <p:blipFill>
+          <a:blip r:embed="rId2">
+            <a:extLst>
+              <a:ext uri="{28A0092B-C50C-407E-A947-70E740481C1C}">
+                <a14:useLocalDpi xmlns:a14="http://schemas.microsoft.com/office/drawing/2010/main" val="0"/>
+              </a:ext>
+            </a:extLst>
+          </a:blip>
+          <a:stretch>
+            <a:fillRect/>
+          </a:stretch>
+        </p:blipFill>
+        <p:spPr>
+          <a:xfrm>
+            <a:off x="156572" y="6405965"/>
+            <a:ext cx="884643" cy="337639"/>
+          </a:xfrm>
+          <a:prstGeom prst="rect">
+            <a:avLst/>
+          </a:prstGeom>
+        </p:spPr>
+      </p:pic>
+      <p:sp>
+        <p:nvSpPr>
+          <p:cNvPr id="13" name="Title 1">
+            <a:extLst>
+              <a:ext uri="{FF2B5EF4-FFF2-40B4-BE49-F238E27FC236}">
+                <a16:creationId xmlns:a16="http://schemas.microsoft.com/office/drawing/2014/main" id="{567D4C82-0CB3-4BEE-9D81-8DDF8ED47658}"/>
+              </a:ext>
+            </a:extLst>
+          </p:cNvPr>
+          <p:cNvSpPr txBox="1">
+            <a:spLocks/>
+          </p:cNvSpPr>
+          <p:nvPr/>
+        </p:nvSpPr>
+        <p:spPr>
+          <a:xfrm>
+            <a:off x="3471731" y="2523066"/>
+            <a:ext cx="5248538" cy="905934"/>
+          </a:xfrm>
+          <a:prstGeom prst="rect">
+            <a:avLst/>
+          </a:prstGeom>
+        </p:spPr>
+        <p:txBody>
+          <a:bodyPr vert="horz" lIns="91440" tIns="45720" rIns="91440" bIns="45720" rtlCol="0" anchor="b">
+            <a:noAutofit/>
+          </a:bodyPr>
+          <a:lstStyle>
+            <a:lvl1pPr algn="ctr" defTabSz="914400" rtl="0" eaLnBrk="1" latinLnBrk="0" hangingPunct="1">
+              <a:lnSpc>
+                <a:spcPct val="90000"/>
+              </a:lnSpc>
+              <a:spcBef>
+                <a:spcPct val="0"/>
+              </a:spcBef>
+              <a:buNone/>
+              <a:defRPr sz="6000" kern="1200">
+                <a:solidFill>
+                  <a:schemeClr val="tx1"/>
+                </a:solidFill>
+                <a:latin typeface="+mj-lt"/>
+                <a:ea typeface="+mj-ea"/>
+                <a:cs typeface="+mj-cs"/>
+              </a:defRPr>
+            </a:lvl1pPr>
+          </a:lstStyle>
+          <a:p>
+            <a:r>
+              <a:rPr lang="en-US" sz="5400" b="1" dirty="0">
+                <a:solidFill>
+                  <a:srgbClr val="C89B38"/>
+                </a:solidFill>
+                <a:latin typeface="BeaufortforLOL-Regular" panose="02020503050000020004" pitchFamily="18" charset="0"/>
+                <a:cs typeface="BeaufortforLOL-Regular" panose="02020503050000020004" pitchFamily="18" charset="0"/>
+              </a:rPr>
+              <a:t>DATA</a:t>
+            </a:r>
+          </a:p>
+        </p:txBody>
+      </p:sp>
+    </p:spTree>
+    <p:extLst>
+      <p:ext uri="{BB962C8B-B14F-4D97-AF65-F5344CB8AC3E}">
+        <p14:creationId xmlns:p14="http://schemas.microsoft.com/office/powerpoint/2010/main" val="2157916191"/>
+      </p:ext>
+    </p:extLst>
+  </p:cSld>
+  <p:clrMapOvr>
+    <a:masterClrMapping/>
+  </p:clrMapOvr>
+</p:sld>
+</file>
+
+<file path=ppt/slides/slide5.xml><?xml version="1.0" encoding="utf-8"?>
+<p:sld xmlns:a="http://schemas.openxmlformats.org/drawingml/2006/main" xmlns:r="http://schemas.openxmlformats.org/officeDocument/2006/relationships" xmlns:p="http://schemas.openxmlformats.org/presentationml/2006/main">
+  <p:cSld>
+    <p:spTree>
+      <p:nvGrpSpPr>
+        <p:cNvPr id="1" name=""/>
+        <p:cNvGrpSpPr/>
+        <p:nvPr/>
+      </p:nvGrpSpPr>
+      <p:grpSpPr>
+        <a:xfrm>
+          <a:off x="0" y="0"/>
+          <a:ext cx="0" cy="0"/>
+          <a:chOff x="0" y="0"/>
+          <a:chExt cx="0" cy="0"/>
+        </a:xfrm>
+      </p:grpSpPr>
+      <p:sp>
+        <p:nvSpPr>
+          <p:cNvPr id="4" name="Rectangle 3">
+            <a:extLst>
+              <a:ext uri="{FF2B5EF4-FFF2-40B4-BE49-F238E27FC236}">
+                <a16:creationId xmlns:a16="http://schemas.microsoft.com/office/drawing/2014/main" id="{8DF61846-AB51-45D4-AAE5-348A089B73AD}"/>
               </a:ext>
             </a:extLst>
           </p:cNvPr>
@@ -4564,18 +4691,18 @@
         </p:nvSpPr>
         <p:spPr>
           <a:xfrm>
-            <a:off x="9230769" y="0"/>
-            <a:ext cx="2961232" cy="6714497"/>
+            <a:off x="0" y="0"/>
+            <a:ext cx="12192000" cy="6743604"/>
           </a:xfrm>
           <a:prstGeom prst="rect">
             <a:avLst/>
           </a:prstGeom>
           <a:solidFill>
-            <a:srgbClr val="132225"/>
+            <a:srgbClr val="0E191D"/>
           </a:solidFill>
           <a:ln>
             <a:solidFill>
-              <a:srgbClr val="132225"/>
+              <a:srgbClr val="0E191D"/>
             </a:solidFill>
           </a:ln>
         </p:spPr>
@@ -4600,16 +4727,16 @@
           <a:lstStyle/>
           <a:p>
             <a:pPr algn="ctr"/>
-            <a:endParaRPr lang="en-US"/>
-          </a:p>
-        </p:txBody>
-      </p:sp>
-      <p:sp>
-        <p:nvSpPr>
-          <p:cNvPr id="7" name="Rectangle 6">
-            <a:extLst>
-              <a:ext uri="{FF2B5EF4-FFF2-40B4-BE49-F238E27FC236}">
-                <a16:creationId xmlns:a16="http://schemas.microsoft.com/office/drawing/2014/main" id="{734FC527-2D8B-4D3E-95EC-95E1B83C236B}"/>
+            <a:endParaRPr lang="en-US" dirty="0"/>
+          </a:p>
+        </p:txBody>
+      </p:sp>
+      <p:sp>
+        <p:nvSpPr>
+          <p:cNvPr id="5" name="Rectangle 4">
+            <a:extLst>
+              <a:ext uri="{FF2B5EF4-FFF2-40B4-BE49-F238E27FC236}">
+                <a16:creationId xmlns:a16="http://schemas.microsoft.com/office/drawing/2014/main" id="{D890954F-FA6E-4DFA-9206-99220FA20E9F}"/>
               </a:ext>
             </a:extLst>
           </p:cNvPr>
@@ -4618,18 +4745,18 @@
         </p:nvSpPr>
         <p:spPr>
           <a:xfrm>
-            <a:off x="9230768" y="6714497"/>
-            <a:ext cx="2961232" cy="143503"/>
+            <a:off x="0" y="6714498"/>
+            <a:ext cx="12192000" cy="143502"/>
           </a:xfrm>
           <a:prstGeom prst="rect">
             <a:avLst/>
           </a:prstGeom>
           <a:solidFill>
-            <a:srgbClr val="091113"/>
+            <a:srgbClr val="080D10"/>
           </a:solidFill>
           <a:ln>
             <a:solidFill>
-              <a:srgbClr val="091113"/>
+              <a:srgbClr val="080D10"/>
             </a:solidFill>
           </a:ln>
         </p:spPr>
@@ -4660,6 +4787,114 @@
       </p:sp>
       <p:sp>
         <p:nvSpPr>
+          <p:cNvPr id="6" name="Rectangle 5">
+            <a:extLst>
+              <a:ext uri="{FF2B5EF4-FFF2-40B4-BE49-F238E27FC236}">
+                <a16:creationId xmlns:a16="http://schemas.microsoft.com/office/drawing/2014/main" id="{3F98857D-DD99-4696-A9D9-5E7BAAEE940F}"/>
+              </a:ext>
+            </a:extLst>
+          </p:cNvPr>
+          <p:cNvSpPr/>
+          <p:nvPr/>
+        </p:nvSpPr>
+        <p:spPr>
+          <a:xfrm>
+            <a:off x="9230769" y="0"/>
+            <a:ext cx="2961232" cy="6714497"/>
+          </a:xfrm>
+          <a:prstGeom prst="rect">
+            <a:avLst/>
+          </a:prstGeom>
+          <a:solidFill>
+            <a:srgbClr val="132225"/>
+          </a:solidFill>
+          <a:ln>
+            <a:solidFill>
+              <a:srgbClr val="132225"/>
+            </a:solidFill>
+          </a:ln>
+        </p:spPr>
+        <p:style>
+          <a:lnRef idx="2">
+            <a:schemeClr val="accent1">
+              <a:shade val="50000"/>
+            </a:schemeClr>
+          </a:lnRef>
+          <a:fillRef idx="1">
+            <a:schemeClr val="accent1"/>
+          </a:fillRef>
+          <a:effectRef idx="0">
+            <a:schemeClr val="accent1"/>
+          </a:effectRef>
+          <a:fontRef idx="minor">
+            <a:schemeClr val="lt1"/>
+          </a:fontRef>
+        </p:style>
+        <p:txBody>
+          <a:bodyPr rtlCol="0" anchor="ctr"/>
+          <a:lstStyle/>
+          <a:p>
+            <a:pPr algn="ctr"/>
+            <a:endParaRPr lang="en-US"/>
+          </a:p>
+        </p:txBody>
+      </p:sp>
+      <p:sp>
+        <p:nvSpPr>
+          <p:cNvPr id="7" name="Rectangle 6">
+            <a:extLst>
+              <a:ext uri="{FF2B5EF4-FFF2-40B4-BE49-F238E27FC236}">
+                <a16:creationId xmlns:a16="http://schemas.microsoft.com/office/drawing/2014/main" id="{734FC527-2D8B-4D3E-95EC-95E1B83C236B}"/>
+              </a:ext>
+            </a:extLst>
+          </p:cNvPr>
+          <p:cNvSpPr/>
+          <p:nvPr/>
+        </p:nvSpPr>
+        <p:spPr>
+          <a:xfrm>
+            <a:off x="9230768" y="6714497"/>
+            <a:ext cx="2961232" cy="143503"/>
+          </a:xfrm>
+          <a:prstGeom prst="rect">
+            <a:avLst/>
+          </a:prstGeom>
+          <a:solidFill>
+            <a:srgbClr val="091113"/>
+          </a:solidFill>
+          <a:ln>
+            <a:solidFill>
+              <a:srgbClr val="091113"/>
+            </a:solidFill>
+          </a:ln>
+        </p:spPr>
+        <p:style>
+          <a:lnRef idx="2">
+            <a:schemeClr val="accent1">
+              <a:shade val="50000"/>
+            </a:schemeClr>
+          </a:lnRef>
+          <a:fillRef idx="1">
+            <a:schemeClr val="accent1"/>
+          </a:fillRef>
+          <a:effectRef idx="0">
+            <a:schemeClr val="accent1"/>
+          </a:effectRef>
+          <a:fontRef idx="minor">
+            <a:schemeClr val="lt1"/>
+          </a:fontRef>
+        </p:style>
+        <p:txBody>
+          <a:bodyPr rtlCol="0" anchor="ctr"/>
+          <a:lstStyle/>
+          <a:p>
+            <a:pPr algn="ctr"/>
+            <a:endParaRPr lang="en-US"/>
+          </a:p>
+        </p:txBody>
+      </p:sp>
+      <p:sp>
+        <p:nvSpPr>
           <p:cNvPr id="2" name="Title 1">
             <a:extLst>
               <a:ext uri="{FF2B5EF4-FFF2-40B4-BE49-F238E27FC236}">
@@ -4797,8 +5032,8 @@
         </p:nvSpPr>
         <p:spPr>
           <a:xfrm>
-            <a:off x="9321430" y="206908"/>
-            <a:ext cx="2122476" cy="246221"/>
+            <a:off x="9321430" y="181507"/>
+            <a:ext cx="2122476" cy="307777"/>
           </a:xfrm>
           <a:prstGeom prst="rect">
             <a:avLst/>
@@ -4812,13 +5047,13 @@
           <a:lstStyle/>
           <a:p>
             <a:r>
-              <a:rPr lang="en-US" sz="1000" dirty="0">
+              <a:rPr lang="en-US" sz="1400" dirty="0">
                 <a:solidFill>
                   <a:srgbClr val="3A796E"/>
                 </a:solidFill>
                 <a:latin typeface="Spiegel-Regular" panose="020B0502060402020504" pitchFamily="34" charset="0"/>
               </a:rPr>
-              <a:t>SECTION FILLER TEXT</a:t>
+              <a:t>DATA</a:t>
             </a:r>
           </a:p>
         </p:txBody>
@@ -4879,7 +5114,7 @@
 </p:sld>
 </file>
 
-<file path=ppt/slides/slide5.xml><?xml version="1.0" encoding="utf-8"?>
+<file path=ppt/slides/slide6.xml><?xml version="1.0" encoding="utf-8"?>
 <p:sld xmlns:a="http://schemas.openxmlformats.org/drawingml/2006/main" xmlns:r="http://schemas.openxmlformats.org/officeDocument/2006/relationships" xmlns:p="http://schemas.openxmlformats.org/presentationml/2006/main">
   <p:cSld>
     <p:spTree>
@@ -5318,8 +5553,8 @@
         </p:nvSpPr>
         <p:spPr>
           <a:xfrm>
-            <a:off x="9321430" y="206908"/>
-            <a:ext cx="2122476" cy="246221"/>
+            <a:off x="9321430" y="181507"/>
+            <a:ext cx="2122476" cy="307777"/>
           </a:xfrm>
           <a:prstGeom prst="rect">
             <a:avLst/>
@@ -5333,7 +5568,7 @@
           <a:lstStyle/>
           <a:p>
             <a:r>
-              <a:rPr lang="en-US" sz="1000" dirty="0">
+              <a:rPr lang="en-US" sz="1400" dirty="0">
                 <a:solidFill>
                   <a:srgbClr val="3A796E"/>
                 </a:solidFill>
@@ -5403,7 +5638,7 @@
         </p:nvSpPr>
         <p:spPr>
           <a:xfrm>
-            <a:off x="733077" y="1785419"/>
+            <a:off x="598893" y="2905056"/>
             <a:ext cx="3882307" cy="1047887"/>
           </a:xfrm>
           <a:prstGeom prst="rect">

</xml_diff>